<commit_message>
pagina terminada, subida video, todo mandado
</commit_message>
<xml_diff>
--- a/Relación entre arrestos de personas de distintas razas y la cantidad de arrestos por estado en EEUU, entre 2018 y 2020.pptx
+++ b/Relación entre arrestos de personas de distintas razas y la cantidad de arrestos por estado en EEUU, entre 2018 y 2020.pptx
@@ -222,7 +222,7 @@
           <a:p>
             <a:fld id="{41EF7AC9-34C1-4F88-8772-517BD051DFC7}" type="datetimeFigureOut">
               <a:rPr lang="es-CL" smtClean="0"/>
-              <a:t>13-12-2021</a:t>
+              <a:t>14-12-2021</a:t>
             </a:fld>
             <a:endParaRPr lang="es-CL"/>
           </a:p>
@@ -286,35 +286,35 @@
           <a:p>
             <a:pPr lvl="0"/>
             <a:r>
-              <a:rPr lang="es-ES" smtClean="0"/>
+              <a:rPr lang="es-ES"/>
               <a:t>Haga clic para modificar el estilo de texto del patrón</a:t>
             </a:r>
           </a:p>
           <a:p>
             <a:pPr lvl="1"/>
             <a:r>
-              <a:rPr lang="es-ES" smtClean="0"/>
+              <a:rPr lang="es-ES"/>
               <a:t>Segundo nivel</a:t>
             </a:r>
           </a:p>
           <a:p>
             <a:pPr lvl="2"/>
             <a:r>
-              <a:rPr lang="es-ES" smtClean="0"/>
+              <a:rPr lang="es-ES"/>
               <a:t>Tercer nivel</a:t>
             </a:r>
           </a:p>
           <a:p>
             <a:pPr lvl="3"/>
             <a:r>
-              <a:rPr lang="es-ES" smtClean="0"/>
+              <a:rPr lang="es-ES"/>
               <a:t>Cuarto nivel</a:t>
             </a:r>
           </a:p>
           <a:p>
             <a:pPr lvl="4"/>
             <a:r>
-              <a:rPr lang="es-ES" smtClean="0"/>
+              <a:rPr lang="es-ES"/>
               <a:t>Quinto nivel</a:t>
             </a:r>
             <a:endParaRPr lang="es-CL"/>
@@ -719,7 +719,7 @@
           <a:p>
             <a:fld id="{1D8BD707-D9CF-40AE-B4C6-C98DA3205C09}" type="datetimeFigureOut">
               <a:rPr lang="en-US"/>
-              <a:t>12/13/2021</a:t>
+              <a:t>12/14/2021</a:t>
             </a:fld>
             <a:endParaRPr lang="en-US"/>
           </a:p>
@@ -896,7 +896,7 @@
           <a:p>
             <a:fld id="{1D8BD707-D9CF-40AE-B4C6-C98DA3205C09}" type="datetimeFigureOut">
               <a:rPr lang="en-US"/>
-              <a:t>12/13/2021</a:t>
+              <a:t>12/14/2021</a:t>
             </a:fld>
             <a:endParaRPr lang="en-US"/>
           </a:p>
@@ -1110,7 +1110,7 @@
           <a:p>
             <a:fld id="{1D8BD707-D9CF-40AE-B4C6-C98DA3205C09}" type="datetimeFigureOut">
               <a:rPr lang="en-US"/>
-              <a:t>12/13/2021</a:t>
+              <a:t>12/14/2021</a:t>
             </a:fld>
             <a:endParaRPr lang="en-US"/>
           </a:p>
@@ -1258,7 +1258,7 @@
           <a:p>
             <a:fld id="{1D8BD707-D9CF-40AE-B4C6-C98DA3205C09}" type="datetimeFigureOut">
               <a:rPr lang="en-US"/>
-              <a:t>12/13/2021</a:t>
+              <a:t>12/14/2021</a:t>
             </a:fld>
             <a:endParaRPr lang="en-US"/>
           </a:p>
@@ -1377,7 +1377,7 @@
           <a:p>
             <a:fld id="{1D8BD707-D9CF-40AE-B4C6-C98DA3205C09}" type="datetimeFigureOut">
               <a:rPr lang="en-US"/>
-              <a:t>12/13/2021</a:t>
+              <a:t>12/14/2021</a:t>
             </a:fld>
             <a:endParaRPr lang="en-US"/>
           </a:p>
@@ -1652,7 +1652,7 @@
           <a:p>
             <a:fld id="{1D8BD707-D9CF-40AE-B4C6-C98DA3205C09}" type="datetimeFigureOut">
               <a:rPr lang="en-US"/>
-              <a:t>12/13/2021</a:t>
+              <a:t>12/14/2021</a:t>
             </a:fld>
             <a:endParaRPr lang="en-US"/>
           </a:p>
@@ -4036,7 +4036,7 @@
               <a:t> </a:t>
             </a:r>
             <a:r>
-              <a:rPr sz="3150" spc="-204" dirty="0" err="1" smtClean="0">
+              <a:rPr sz="3150" spc="-204" dirty="0" err="1">
                 <a:solidFill>
                   <a:srgbClr val="272352"/>
                 </a:solidFill>
@@ -4046,17 +4046,17 @@
               <a:t>mismos</a:t>
             </a:r>
             <a:r>
-              <a:rPr lang="es-MX" sz="3150" spc="-204" dirty="0" smtClean="0">
-                <a:solidFill>
-                  <a:srgbClr val="272352"/>
-                </a:solidFill>
-                <a:latin typeface="Bahnschrift"/>
-                <a:cs typeface="Bahnschrift"/>
-              </a:rPr>
-              <a:t> </a:t>
-            </a:r>
-            <a:r>
-              <a:rPr sz="3150" spc="-204" dirty="0" err="1" smtClean="0">
+              <a:rPr lang="es-MX" sz="3150" spc="-204" dirty="0">
+                <a:solidFill>
+                  <a:srgbClr val="272352"/>
+                </a:solidFill>
+                <a:latin typeface="Bahnschrift"/>
+                <a:cs typeface="Bahnschrift"/>
+              </a:rPr>
+              <a:t> </a:t>
+            </a:r>
+            <a:r>
+              <a:rPr sz="3150" spc="-204" dirty="0" err="1">
                 <a:solidFill>
                   <a:srgbClr val="272352"/>
                 </a:solidFill>
@@ -4066,7 +4066,7 @@
               <a:t>estados</a:t>
             </a:r>
             <a:r>
-              <a:rPr lang="es-MX" sz="3150" spc="-204" dirty="0" smtClean="0">
+              <a:rPr lang="es-MX" sz="3150" spc="-204" dirty="0">
                 <a:solidFill>
                   <a:srgbClr val="272352"/>
                 </a:solidFill>
@@ -4076,7 +4076,7 @@
               <a:t>, además que los porcentajes negativos pasan a ser muy bajos</a:t>
             </a:r>
             <a:r>
-              <a:rPr sz="3150" spc="-160" dirty="0" smtClean="0">
+              <a:rPr sz="3150" spc="-160" dirty="0">
                 <a:solidFill>
                   <a:srgbClr val="272352"/>
                 </a:solidFill>
@@ -4086,7 +4086,7 @@
               <a:t>.</a:t>
             </a:r>
             <a:r>
-              <a:rPr lang="es-MX" sz="3150" spc="-160" dirty="0" smtClean="0">
+              <a:rPr lang="es-MX" sz="3150" spc="-160" dirty="0">
                 <a:solidFill>
                   <a:srgbClr val="272352"/>
                 </a:solidFill>
@@ -4262,7 +4262,7 @@
               <a:t> </a:t>
             </a:r>
             <a:r>
-              <a:rPr sz="4100" u="sng" spc="-245" dirty="0" smtClean="0">
+              <a:rPr sz="4100" u="sng" spc="-245" dirty="0">
                 <a:solidFill>
                   <a:srgbClr val="272352"/>
                 </a:solidFill>
@@ -4272,7 +4272,7 @@
               <a:t>2</a:t>
             </a:r>
             <a:r>
-              <a:rPr sz="4100" u="sng" spc="-285" dirty="0" smtClean="0">
+              <a:rPr sz="4100" u="sng" spc="-285" dirty="0">
                 <a:solidFill>
                   <a:srgbClr val="272352"/>
                 </a:solidFill>
@@ -4282,7 +4282,7 @@
               <a:t>0</a:t>
             </a:r>
             <a:r>
-              <a:rPr sz="4100" u="sng" spc="-130" dirty="0" smtClean="0">
+              <a:rPr sz="4100" u="sng" spc="-130" dirty="0">
                 <a:solidFill>
                   <a:srgbClr val="272352"/>
                 </a:solidFill>
@@ -4292,7 +4292,7 @@
               <a:t>1</a:t>
             </a:r>
             <a:r>
-              <a:rPr sz="4100" u="sng" spc="-310" dirty="0" smtClean="0">
+              <a:rPr sz="4100" u="sng" spc="-310" dirty="0">
                 <a:solidFill>
                   <a:srgbClr val="272352"/>
                 </a:solidFill>
@@ -4302,7 +4302,7 @@
               <a:t>8</a:t>
             </a:r>
             <a:r>
-              <a:rPr sz="4100" u="sng" spc="-254" dirty="0" smtClean="0">
+              <a:rPr sz="4100" u="sng" spc="-254" dirty="0">
                 <a:solidFill>
                   <a:srgbClr val="272352"/>
                 </a:solidFill>
@@ -4312,7 +4312,7 @@
               <a:t>-</a:t>
             </a:r>
             <a:r>
-              <a:rPr sz="4100" u="sng" spc="-245" dirty="0" smtClean="0">
+              <a:rPr sz="4100" u="sng" spc="-245" dirty="0">
                 <a:solidFill>
                   <a:srgbClr val="272352"/>
                 </a:solidFill>
@@ -4322,7 +4322,7 @@
               <a:t>2</a:t>
             </a:r>
             <a:r>
-              <a:rPr sz="4100" u="sng" spc="-285" dirty="0" smtClean="0">
+              <a:rPr sz="4100" u="sng" spc="-285" dirty="0">
                 <a:solidFill>
                   <a:srgbClr val="272352"/>
                 </a:solidFill>
@@ -4332,7 +4332,7 @@
               <a:t>0</a:t>
             </a:r>
             <a:r>
-              <a:rPr sz="4100" u="sng" spc="-130" dirty="0" smtClean="0">
+              <a:rPr sz="4100" u="sng" spc="-130" dirty="0">
                 <a:solidFill>
                   <a:srgbClr val="272352"/>
                 </a:solidFill>
@@ -4342,7 +4342,7 @@
               <a:t>1</a:t>
             </a:r>
             <a:r>
-              <a:rPr sz="4100" u="sng" dirty="0" smtClean="0">
+              <a:rPr sz="4100" u="sng" dirty="0">
                 <a:solidFill>
                   <a:srgbClr val="272352"/>
                 </a:solidFill>
@@ -4644,7 +4644,7 @@
               </a:spcBef>
             </a:pPr>
             <a:r>
-              <a:rPr lang="es-MX" sz="4350" spc="-455" dirty="0" smtClean="0">
+              <a:rPr lang="es-MX" sz="4350" spc="-455" dirty="0">
                 <a:solidFill>
                   <a:srgbClr val="272352"/>
                 </a:solidFill>
@@ -4664,7 +4664,7 @@
               </a:spcBef>
             </a:pPr>
             <a:r>
-              <a:rPr lang="es-MX" sz="4350" spc="-455" dirty="0" smtClean="0">
+              <a:rPr lang="es-MX" sz="4350" spc="-455" dirty="0">
                 <a:solidFill>
                   <a:srgbClr val="272352"/>
                 </a:solidFill>
@@ -4684,7 +4684,7 @@
               </a:spcBef>
             </a:pPr>
             <a:r>
-              <a:rPr lang="es-MX" sz="4350" spc="-455" dirty="0" err="1" smtClean="0">
+              <a:rPr lang="es-MX" sz="4350" spc="-455" dirty="0" err="1">
                 <a:solidFill>
                   <a:srgbClr val="272352"/>
                 </a:solidFill>
@@ -4730,7 +4730,7 @@
               </a:spcBef>
             </a:pPr>
             <a:r>
-              <a:rPr lang="es-MX" sz="4350" spc="-180" dirty="0" smtClean="0">
+              <a:rPr lang="es-MX" sz="4350" spc="-180" dirty="0">
                 <a:solidFill>
                   <a:srgbClr val="272352"/>
                 </a:solidFill>
@@ -4740,7 +4740,7 @@
               <a:t>-55 </a:t>
             </a:r>
             <a:r>
-              <a:rPr sz="4350" spc="-180" dirty="0" smtClean="0">
+              <a:rPr sz="4350" spc="-180" dirty="0">
                 <a:solidFill>
                   <a:srgbClr val="272352"/>
                 </a:solidFill>
@@ -4764,7 +4764,7 @@
               </a:spcBef>
             </a:pPr>
             <a:r>
-              <a:rPr lang="es-MX" sz="4350" spc="-175" dirty="0" smtClean="0">
+              <a:rPr lang="es-MX" sz="4350" spc="-175" dirty="0">
                 <a:solidFill>
                   <a:srgbClr val="272352"/>
                 </a:solidFill>
@@ -4774,7 +4774,7 @@
               <a:t> -11</a:t>
             </a:r>
             <a:r>
-              <a:rPr sz="4350" spc="-175" dirty="0" smtClean="0">
+              <a:rPr sz="4350" spc="-175" dirty="0">
                 <a:solidFill>
                   <a:srgbClr val="272352"/>
                 </a:solidFill>
@@ -4795,7 +4795,7 @@
               </a:lnSpc>
             </a:pPr>
             <a:r>
-              <a:rPr lang="es-MX" sz="4350" spc="-140" dirty="0" smtClean="0">
+              <a:rPr lang="es-MX" sz="4350" spc="-140" dirty="0">
                 <a:solidFill>
                   <a:srgbClr val="272352"/>
                 </a:solidFill>
@@ -6002,7 +6002,7 @@
               </a:spcBef>
             </a:pPr>
             <a:r>
-              <a:rPr lang="es-MX" sz="4800" spc="-175" dirty="0" smtClean="0">
+              <a:rPr lang="es-MX" sz="4800" spc="-175" dirty="0">
                 <a:solidFill>
                   <a:srgbClr val="272352"/>
                 </a:solidFill>
@@ -6022,7 +6022,7 @@
               </a:spcBef>
             </a:pPr>
             <a:r>
-              <a:rPr lang="es-MX" sz="4800" spc="-175" dirty="0" smtClean="0">
+              <a:rPr lang="es-MX" sz="4800" spc="-175" dirty="0">
                 <a:solidFill>
                   <a:srgbClr val="272352"/>
                 </a:solidFill>
@@ -6042,7 +6042,7 @@
               </a:spcBef>
             </a:pPr>
             <a:r>
-              <a:rPr lang="es-MX" sz="4800" spc="-175" dirty="0" smtClean="0">
+              <a:rPr lang="es-MX" sz="4800" spc="-175" dirty="0">
                 <a:solidFill>
                   <a:srgbClr val="272352"/>
                 </a:solidFill>
@@ -6088,7 +6088,7 @@
               </a:spcBef>
             </a:pPr>
             <a:r>
-              <a:rPr sz="4100" u="sng" spc="-465" dirty="0" err="1" smtClean="0">
+              <a:rPr sz="4100" u="sng" spc="-465" dirty="0" err="1">
                 <a:solidFill>
                   <a:srgbClr val="272352"/>
                 </a:solidFill>
@@ -6098,7 +6098,7 @@
               <a:t>M</a:t>
             </a:r>
             <a:r>
-              <a:rPr sz="4100" u="sng" spc="-260" dirty="0" err="1" smtClean="0">
+              <a:rPr sz="4100" u="sng" spc="-260" dirty="0" err="1">
                 <a:solidFill>
                   <a:srgbClr val="272352"/>
                 </a:solidFill>
@@ -6108,7 +6108,7 @@
               <a:t>áx</a:t>
             </a:r>
             <a:r>
-              <a:rPr sz="4100" u="sng" spc="-110" dirty="0" err="1" smtClean="0">
+              <a:rPr sz="4100" u="sng" spc="-110" dirty="0" err="1">
                 <a:solidFill>
                   <a:srgbClr val="272352"/>
                 </a:solidFill>
@@ -6118,7 +6118,7 @@
               <a:t>i</a:t>
             </a:r>
             <a:r>
-              <a:rPr sz="4100" u="sng" spc="-459" dirty="0" err="1" smtClean="0">
+              <a:rPr sz="4100" u="sng" spc="-459" dirty="0" err="1">
                 <a:solidFill>
                   <a:srgbClr val="272352"/>
                 </a:solidFill>
@@ -6128,7 +6128,7 @@
               <a:t>m</a:t>
             </a:r>
             <a:r>
-              <a:rPr sz="4100" u="sng" spc="-330" dirty="0" err="1" smtClean="0">
+              <a:rPr sz="4100" u="sng" spc="-330" dirty="0" err="1">
                 <a:solidFill>
                   <a:srgbClr val="272352"/>
                 </a:solidFill>
@@ -6138,7 +6138,7 @@
               <a:t>o</a:t>
             </a:r>
             <a:r>
-              <a:rPr sz="4100" u="sng" dirty="0" err="1" smtClean="0">
+              <a:rPr sz="4100" u="sng" dirty="0" err="1">
                 <a:solidFill>
                   <a:srgbClr val="272352"/>
                 </a:solidFill>
@@ -6148,17 +6148,17 @@
               <a:t>s</a:t>
             </a:r>
             <a:r>
-              <a:rPr sz="4100" u="sng" spc="-95" dirty="0" smtClean="0">
-                <a:solidFill>
-                  <a:srgbClr val="272352"/>
-                </a:solidFill>
-                <a:latin typeface="Bahnschrift"/>
-                <a:cs typeface="Bahnschrift"/>
-              </a:rPr>
-              <a:t> </a:t>
-            </a:r>
-            <a:r>
-              <a:rPr sz="4100" u="sng" spc="-300" dirty="0" smtClean="0">
+              <a:rPr sz="4100" u="sng" spc="-95" dirty="0">
+                <a:solidFill>
+                  <a:srgbClr val="272352"/>
+                </a:solidFill>
+                <a:latin typeface="Bahnschrift"/>
+                <a:cs typeface="Bahnschrift"/>
+              </a:rPr>
+              <a:t> </a:t>
+            </a:r>
+            <a:r>
+              <a:rPr sz="4100" u="sng" spc="-300" dirty="0">
                 <a:solidFill>
                   <a:srgbClr val="272352"/>
                 </a:solidFill>
@@ -6168,7 +6168,7 @@
               <a:t>en</a:t>
             </a:r>
             <a:r>
-              <a:rPr sz="4100" u="sng" spc="-135" dirty="0" smtClean="0">
+              <a:rPr sz="4100" u="sng" spc="-135" dirty="0">
                 <a:solidFill>
                   <a:srgbClr val="272352"/>
                 </a:solidFill>
@@ -6178,7 +6178,7 @@
               <a:t>t</a:t>
             </a:r>
             <a:r>
-              <a:rPr sz="4100" u="sng" spc="-235" dirty="0" smtClean="0">
+              <a:rPr sz="4100" u="sng" spc="-235" dirty="0">
                 <a:solidFill>
                   <a:srgbClr val="272352"/>
                 </a:solidFill>
@@ -6188,7 +6188,7 @@
               <a:t>r</a:t>
             </a:r>
             <a:r>
-              <a:rPr sz="4100" u="sng" dirty="0" smtClean="0">
+              <a:rPr sz="4100" u="sng" dirty="0">
                 <a:solidFill>
                   <a:srgbClr val="272352"/>
                 </a:solidFill>
@@ -6198,17 +6198,17 @@
               <a:t>e</a:t>
             </a:r>
             <a:r>
-              <a:rPr sz="4100" u="sng" spc="-55" dirty="0" smtClean="0">
-                <a:solidFill>
-                  <a:srgbClr val="272352"/>
-                </a:solidFill>
-                <a:latin typeface="Bahnschrift"/>
-                <a:cs typeface="Bahnschrift"/>
-              </a:rPr>
-              <a:t> </a:t>
-            </a:r>
-            <a:r>
-              <a:rPr sz="4100" u="sng" spc="-245" dirty="0" smtClean="0">
+              <a:rPr sz="4100" u="sng" spc="-55" dirty="0">
+                <a:solidFill>
+                  <a:srgbClr val="272352"/>
+                </a:solidFill>
+                <a:latin typeface="Bahnschrift"/>
+                <a:cs typeface="Bahnschrift"/>
+              </a:rPr>
+              <a:t> </a:t>
+            </a:r>
+            <a:r>
+              <a:rPr sz="4100" u="sng" spc="-245" dirty="0">
                 <a:solidFill>
                   <a:srgbClr val="272352"/>
                 </a:solidFill>
@@ -6218,7 +6218,7 @@
               <a:t>2</a:t>
             </a:r>
             <a:r>
-              <a:rPr sz="4100" u="sng" spc="-285" dirty="0" smtClean="0">
+              <a:rPr sz="4100" u="sng" spc="-285" dirty="0">
                 <a:solidFill>
                   <a:srgbClr val="272352"/>
                 </a:solidFill>
@@ -6228,7 +6228,7 @@
               <a:t>0</a:t>
             </a:r>
             <a:r>
-              <a:rPr sz="4100" u="sng" spc="-130" dirty="0" smtClean="0">
+              <a:rPr sz="4100" u="sng" spc="-130" dirty="0">
                 <a:solidFill>
                   <a:srgbClr val="272352"/>
                 </a:solidFill>
@@ -6238,7 +6238,7 @@
               <a:t>1</a:t>
             </a:r>
             <a:r>
-              <a:rPr sz="4100" u="sng" spc="-305" dirty="0" smtClean="0">
+              <a:rPr sz="4100" u="sng" spc="-305" dirty="0">
                 <a:solidFill>
                   <a:srgbClr val="272352"/>
                 </a:solidFill>
@@ -6248,7 +6248,7 @@
               <a:t>8</a:t>
             </a:r>
             <a:r>
-              <a:rPr sz="4100" u="sng" spc="-254" dirty="0" smtClean="0">
+              <a:rPr sz="4100" u="sng" spc="-254" dirty="0">
                 <a:solidFill>
                   <a:srgbClr val="272352"/>
                 </a:solidFill>
@@ -6258,7 +6258,7 @@
               <a:t>-</a:t>
             </a:r>
             <a:r>
-              <a:rPr sz="4100" u="sng" spc="-245" dirty="0" smtClean="0">
+              <a:rPr sz="4100" u="sng" spc="-245" dirty="0">
                 <a:solidFill>
                   <a:srgbClr val="272352"/>
                 </a:solidFill>
@@ -6268,7 +6268,7 @@
               <a:t>2</a:t>
             </a:r>
             <a:r>
-              <a:rPr sz="4100" u="sng" spc="-285" dirty="0" smtClean="0">
+              <a:rPr sz="4100" u="sng" spc="-285" dirty="0">
                 <a:solidFill>
                   <a:srgbClr val="272352"/>
                 </a:solidFill>
@@ -6278,7 +6278,7 @@
               <a:t>0</a:t>
             </a:r>
             <a:r>
-              <a:rPr sz="4100" u="sng" spc="-130" dirty="0" smtClean="0">
+              <a:rPr sz="4100" u="sng" spc="-130" dirty="0">
                 <a:solidFill>
                   <a:srgbClr val="272352"/>
                 </a:solidFill>
@@ -6288,7 +6288,7 @@
               <a:t>1</a:t>
             </a:r>
             <a:r>
-              <a:rPr sz="4100" u="sng" dirty="0" smtClean="0">
+              <a:rPr sz="4100" u="sng" dirty="0">
                 <a:solidFill>
                   <a:srgbClr val="272352"/>
                 </a:solidFill>
@@ -6315,7 +6315,7 @@
               </a:spcBef>
             </a:pPr>
             <a:r>
-              <a:rPr lang="es-MX" sz="4100" dirty="0" smtClean="0">
+              <a:rPr lang="es-MX" sz="4100" dirty="0">
                 <a:solidFill>
                   <a:srgbClr val="002060"/>
                 </a:solidFill>
@@ -6335,7 +6335,7 @@
               </a:spcBef>
             </a:pPr>
             <a:r>
-              <a:rPr lang="es-MX" sz="4100" dirty="0" smtClean="0">
+              <a:rPr lang="es-MX" sz="4100" dirty="0">
                 <a:solidFill>
                   <a:srgbClr val="002060"/>
                 </a:solidFill>
@@ -6355,7 +6355,7 @@
               </a:spcBef>
             </a:pPr>
             <a:r>
-              <a:rPr lang="es-MX" sz="4100" dirty="0" smtClean="0">
+              <a:rPr lang="es-MX" sz="4100" dirty="0">
                 <a:solidFill>
                   <a:srgbClr val="002060"/>
                 </a:solidFill>
@@ -6667,7 +6667,7 @@
               </a:spcBef>
             </a:pPr>
             <a:r>
-              <a:rPr lang="es-MX" sz="3150" dirty="0" smtClean="0">
+              <a:rPr lang="es-MX" sz="3150" dirty="0">
                 <a:solidFill>
                   <a:srgbClr val="002060"/>
                 </a:solidFill>
@@ -6677,7 +6677,7 @@
               <a:t>Vemos que aquí también aumentan los porcentajes, en este caso solo se mantiene Pensilvania entre los máximos. </a:t>
             </a:r>
             <a:r>
-              <a:rPr lang="es-MX" sz="3150" dirty="0" err="1" smtClean="0">
+              <a:rPr lang="es-MX" sz="3150" dirty="0" err="1">
                 <a:solidFill>
                   <a:srgbClr val="002060"/>
                 </a:solidFill>
@@ -6687,7 +6687,7 @@
               <a:t>Estan</a:t>
             </a:r>
             <a:r>
-              <a:rPr lang="es-MX" sz="3150" dirty="0" smtClean="0">
+              <a:rPr lang="es-MX" sz="3150" dirty="0">
                 <a:solidFill>
                   <a:srgbClr val="002060"/>
                 </a:solidFill>
@@ -7846,7 +7846,7 @@
               <a:t> </a:t>
             </a:r>
             <a:r>
-              <a:rPr sz="3100" spc="-190" dirty="0" err="1" smtClean="0">
+              <a:rPr sz="3100" spc="-190" dirty="0" err="1">
                 <a:solidFill>
                   <a:srgbClr val="272352"/>
                 </a:solidFill>
@@ -7856,7 +7856,7 @@
               <a:t>analizarlo</a:t>
             </a:r>
             <a:r>
-              <a:rPr lang="es-MX" sz="3100" spc="-190" dirty="0" smtClean="0">
+              <a:rPr lang="es-MX" sz="3100" spc="-190" dirty="0">
                 <a:solidFill>
                   <a:srgbClr val="272352"/>
                 </a:solidFill>
@@ -7919,7 +7919,7 @@
           <a:lstStyle/>
           <a:p>
             <a:r>
-              <a:rPr lang="es-MX" sz="3100" b="1" dirty="0" smtClean="0">
+              <a:rPr lang="es-MX" sz="3100" b="1" dirty="0">
                 <a:solidFill>
                   <a:srgbClr val="002060"/>
                 </a:solidFill>
@@ -8806,17 +8806,17 @@
                 <a:latin typeface="Bahnschrift"/>
                 <a:cs typeface="Bahnschrift"/>
               </a:rPr>
-              <a:t>Los </a:t>
-            </a:r>
-            <a:r>
-              <a:rPr lang="es-MX" sz="3100" spc="-310" dirty="0" smtClean="0">
-                <a:solidFill>
-                  <a:srgbClr val="272352"/>
-                </a:solidFill>
-                <a:latin typeface="Bahnschrift"/>
-                <a:cs typeface="Bahnschrift"/>
-              </a:rPr>
-              <a:t> datos  muestran  que  </a:t>
+              <a:t>Los  datos  muestran  que  los  grupos  0 y  2  son  los  que  tienen  menos  arrestos de personas de color.  Los </a:t>
+            </a:r>
+            <a:r>
+              <a:rPr lang="es-MX" sz="3100" spc="-310" dirty="0" err="1">
+                <a:solidFill>
+                  <a:srgbClr val="272352"/>
+                </a:solidFill>
+                <a:latin typeface="Bahnschrift"/>
+                <a:cs typeface="Bahnschrift"/>
+              </a:rPr>
+              <a:t>clusters</a:t>
             </a:r>
             <a:r>
               <a:rPr lang="es-MX" sz="3100" spc="-310" dirty="0">
@@ -8826,187 +8826,7 @@
                 <a:latin typeface="Bahnschrift"/>
                 <a:cs typeface="Bahnschrift"/>
               </a:rPr>
-              <a:t>los </a:t>
-            </a:r>
-            <a:r>
-              <a:rPr lang="es-MX" sz="3100" spc="-310" dirty="0" smtClean="0">
-                <a:solidFill>
-                  <a:srgbClr val="272352"/>
-                </a:solidFill>
-                <a:latin typeface="Bahnschrift"/>
-                <a:cs typeface="Bahnschrift"/>
-              </a:rPr>
-              <a:t> grupos  </a:t>
-            </a:r>
-            <a:r>
-              <a:rPr lang="es-MX" sz="3100" spc="-310" dirty="0" smtClean="0">
-                <a:solidFill>
-                  <a:srgbClr val="272352"/>
-                </a:solidFill>
-                <a:latin typeface="Bahnschrift"/>
-                <a:cs typeface="Bahnschrift"/>
-              </a:rPr>
-              <a:t>0 </a:t>
-            </a:r>
-            <a:r>
-              <a:rPr lang="es-MX" sz="3100" spc="-310" dirty="0" smtClean="0">
-                <a:solidFill>
-                  <a:srgbClr val="272352"/>
-                </a:solidFill>
-                <a:latin typeface="Bahnschrift"/>
-                <a:cs typeface="Bahnschrift"/>
-              </a:rPr>
-              <a:t>y  </a:t>
-            </a:r>
-            <a:r>
-              <a:rPr lang="es-MX" sz="3100" spc="-310" dirty="0" smtClean="0">
-                <a:solidFill>
-                  <a:srgbClr val="272352"/>
-                </a:solidFill>
-                <a:latin typeface="Bahnschrift"/>
-                <a:cs typeface="Bahnschrift"/>
-              </a:rPr>
-              <a:t>2  </a:t>
-            </a:r>
-            <a:r>
-              <a:rPr lang="es-MX" sz="3100" spc="-310" dirty="0">
-                <a:solidFill>
-                  <a:srgbClr val="272352"/>
-                </a:solidFill>
-                <a:latin typeface="Bahnschrift"/>
-                <a:cs typeface="Bahnschrift"/>
-              </a:rPr>
-              <a:t>son </a:t>
-            </a:r>
-            <a:r>
-              <a:rPr lang="es-MX" sz="3100" spc="-310" dirty="0" smtClean="0">
-                <a:solidFill>
-                  <a:srgbClr val="272352"/>
-                </a:solidFill>
-                <a:latin typeface="Bahnschrift"/>
-                <a:cs typeface="Bahnschrift"/>
-              </a:rPr>
-              <a:t> los  que  </a:t>
-            </a:r>
-            <a:r>
-              <a:rPr lang="es-MX" sz="3100" spc="-310" dirty="0">
-                <a:solidFill>
-                  <a:srgbClr val="272352"/>
-                </a:solidFill>
-                <a:latin typeface="Bahnschrift"/>
-                <a:cs typeface="Bahnschrift"/>
-              </a:rPr>
-              <a:t>tienen </a:t>
-            </a:r>
-            <a:r>
-              <a:rPr lang="es-MX" sz="3100" spc="-310" dirty="0" smtClean="0">
-                <a:solidFill>
-                  <a:srgbClr val="272352"/>
-                </a:solidFill>
-                <a:latin typeface="Bahnschrift"/>
-                <a:cs typeface="Bahnschrift"/>
-              </a:rPr>
-              <a:t> menos  arrestos de personas de color.  Los </a:t>
-            </a:r>
-            <a:r>
-              <a:rPr lang="es-MX" sz="3100" spc="-310" dirty="0" err="1" smtClean="0">
-                <a:solidFill>
-                  <a:srgbClr val="272352"/>
-                </a:solidFill>
-                <a:latin typeface="Bahnschrift"/>
-                <a:cs typeface="Bahnschrift"/>
-              </a:rPr>
-              <a:t>clusters</a:t>
-            </a:r>
-            <a:r>
-              <a:rPr lang="es-MX" sz="3100" spc="-310" dirty="0" smtClean="0">
-                <a:solidFill>
-                  <a:srgbClr val="272352"/>
-                </a:solidFill>
-                <a:latin typeface="Bahnschrift"/>
-                <a:cs typeface="Bahnschrift"/>
-              </a:rPr>
-              <a:t> </a:t>
-            </a:r>
-            <a:r>
-              <a:rPr lang="es-MX" sz="3100" spc="-310" dirty="0" smtClean="0">
-                <a:solidFill>
-                  <a:srgbClr val="272352"/>
-                </a:solidFill>
-                <a:latin typeface="Bahnschrift"/>
-                <a:cs typeface="Bahnschrift"/>
-              </a:rPr>
-              <a:t>1 </a:t>
-            </a:r>
-            <a:r>
-              <a:rPr lang="es-MX" sz="3100" spc="-310" dirty="0" smtClean="0">
-                <a:solidFill>
-                  <a:srgbClr val="272352"/>
-                </a:solidFill>
-                <a:latin typeface="Bahnschrift"/>
-                <a:cs typeface="Bahnschrift"/>
-              </a:rPr>
-              <a:t>y </a:t>
-            </a:r>
-            <a:r>
-              <a:rPr lang="es-MX" sz="3100" spc="-310" dirty="0" smtClean="0">
-                <a:solidFill>
-                  <a:srgbClr val="272352"/>
-                </a:solidFill>
-                <a:latin typeface="Bahnschrift"/>
-                <a:cs typeface="Bahnschrift"/>
-              </a:rPr>
-              <a:t>3 </a:t>
-            </a:r>
-            <a:r>
-              <a:rPr lang="es-MX" sz="3100" spc="-310" dirty="0" smtClean="0">
-                <a:solidFill>
-                  <a:srgbClr val="272352"/>
-                </a:solidFill>
-                <a:latin typeface="Bahnschrift"/>
-                <a:cs typeface="Bahnschrift"/>
-              </a:rPr>
-              <a:t>tienen mayor cantidad de </a:t>
-            </a:r>
-            <a:r>
-              <a:rPr lang="es-MX" sz="3100" spc="-310" dirty="0" smtClean="0">
-                <a:solidFill>
-                  <a:srgbClr val="272352"/>
-                </a:solidFill>
-                <a:latin typeface="Bahnschrift"/>
-                <a:cs typeface="Bahnschrift"/>
-              </a:rPr>
-              <a:t>arrestos</a:t>
-            </a:r>
-            <a:r>
-              <a:rPr lang="es-MX" sz="3100" spc="-310" dirty="0">
-                <a:solidFill>
-                  <a:srgbClr val="272352"/>
-                </a:solidFill>
-                <a:latin typeface="Bahnschrift"/>
-                <a:cs typeface="Bahnschrift"/>
-              </a:rPr>
-              <a:t> </a:t>
-            </a:r>
-            <a:r>
-              <a:rPr lang="es-MX" sz="3100" spc="-310" dirty="0" smtClean="0">
-                <a:solidFill>
-                  <a:srgbClr val="272352"/>
-                </a:solidFill>
-                <a:latin typeface="Bahnschrift"/>
-                <a:cs typeface="Bahnschrift"/>
-              </a:rPr>
-              <a:t>de estos individuos.</a:t>
-            </a:r>
-            <a:r>
-              <a:rPr lang="es-MX" sz="3100" spc="-310" dirty="0" smtClean="0">
-                <a:solidFill>
-                  <a:srgbClr val="272352"/>
-                </a:solidFill>
-                <a:latin typeface="Bahnschrift"/>
-                <a:cs typeface="Bahnschrift"/>
-              </a:rPr>
-              <a:t> </a:t>
+              <a:t>  1  y  3 tienen mayor cantidad de arrestos de estos individuos. </a:t>
             </a:r>
             <a:endParaRPr lang="es-CL" dirty="0"/>
           </a:p>
@@ -9565,7 +9385,7 @@
           <a:lstStyle/>
           <a:p>
             <a:r>
-              <a:rPr lang="es-MX" dirty="0" smtClean="0"/>
+              <a:rPr lang="es-MX" dirty="0"/>
               <a:t>Además hicimos regresión lineal para ver si la población y la cantidad de arrestos tenían alguna relación.</a:t>
             </a:r>
             <a:endParaRPr lang="es-CL" dirty="0"/>
@@ -9615,66 +9435,65 @@
               </a:spcBef>
             </a:pPr>
             <a:r>
-              <a:rPr lang="es-MX" kern="0" spc="10" dirty="0" smtClean="0"/>
+              <a:rPr lang="es-MX" kern="0" spc="10" dirty="0"/>
               <a:t>5. </a:t>
             </a:r>
             <a:r>
-              <a:rPr lang="es-MX" kern="0" spc="5" dirty="0" smtClean="0"/>
+              <a:rPr lang="es-MX" kern="0" spc="5" dirty="0"/>
               <a:t>¿Existen </a:t>
             </a:r>
             <a:r>
-              <a:rPr lang="es-MX" kern="0" spc="50" dirty="0" smtClean="0"/>
+              <a:rPr lang="es-MX" kern="0" spc="50" dirty="0"/>
               <a:t>grupos </a:t>
             </a:r>
             <a:r>
-              <a:rPr lang="es-MX" kern="0" spc="10" dirty="0" smtClean="0"/>
+              <a:rPr lang="es-MX" kern="0" spc="10" dirty="0"/>
               <a:t>que </a:t>
             </a:r>
             <a:r>
-              <a:rPr lang="es-MX" kern="0" spc="5" dirty="0" smtClean="0"/>
+              <a:rPr lang="es-MX" kern="0" spc="5" dirty="0"/>
               <a:t>tengan </a:t>
             </a:r>
             <a:r>
-              <a:rPr lang="es-MX" kern="0" spc="15" dirty="0" smtClean="0"/>
+              <a:rPr lang="es-MX" kern="0" spc="15" dirty="0"/>
               <a:t>relación </a:t>
             </a:r>
             <a:r>
-              <a:rPr lang="es-MX" kern="0" spc="10" dirty="0" smtClean="0"/>
+              <a:rPr lang="es-MX" kern="0" spc="10" dirty="0"/>
               <a:t>basados </a:t>
             </a:r>
             <a:r>
-              <a:rPr lang="es-MX" kern="0" spc="5" dirty="0" smtClean="0"/>
+              <a:rPr lang="es-MX" kern="0" spc="5" dirty="0"/>
               <a:t>en </a:t>
             </a:r>
             <a:r>
-              <a:rPr lang="es-MX" kern="0" spc="-1505" dirty="0" smtClean="0"/>
-              <a:t> </a:t>
-            </a:r>
-            <a:r>
-              <a:rPr lang="es-MX" kern="0" spc="5" dirty="0" smtClean="0"/>
+              <a:rPr lang="es-MX" kern="0" spc="-1505" dirty="0"/>
+              <a:t> </a:t>
+            </a:r>
+            <a:r>
+              <a:rPr lang="es-MX" kern="0" spc="5" dirty="0"/>
               <a:t>la</a:t>
             </a:r>
             <a:r>
-              <a:rPr lang="es-MX" kern="0" dirty="0" smtClean="0"/>
-              <a:t> </a:t>
-            </a:r>
-            <a:r>
-              <a:rPr lang="es-MX" kern="0" spc="25" dirty="0" smtClean="0"/>
+              <a:rPr lang="es-MX" kern="0" dirty="0"/>
+              <a:t> </a:t>
+            </a:r>
+            <a:r>
+              <a:rPr lang="es-MX" kern="0" spc="25" dirty="0"/>
               <a:t>información</a:t>
             </a:r>
             <a:r>
-              <a:rPr lang="es-MX" kern="0" spc="10" dirty="0" smtClean="0"/>
+              <a:rPr lang="es-MX" kern="0" spc="10" dirty="0"/>
               <a:t> que</a:t>
             </a:r>
             <a:r>
-              <a:rPr lang="es-MX" kern="0" spc="15" dirty="0" smtClean="0"/>
-              <a:t> </a:t>
-            </a:r>
-            <a:r>
-              <a:rPr lang="es-MX" kern="0" spc="10" dirty="0" smtClean="0"/>
+              <a:rPr lang="es-MX" kern="0" spc="15" dirty="0"/>
+              <a:t> </a:t>
+            </a:r>
+            <a:r>
+              <a:rPr lang="es-MX" kern="0" spc="10" dirty="0"/>
               <a:t>tenemos?</a:t>
             </a:r>
-            <a:endParaRPr lang="es-MX" kern="0" spc="10" dirty="0"/>
           </a:p>
         </p:txBody>
       </p:sp>
@@ -9764,7 +9583,7 @@
           <a:lstStyle/>
           <a:p>
             <a:r>
-              <a:rPr lang="es-MX" sz="3100" spc="-310" dirty="0" smtClean="0">
+              <a:rPr lang="es-MX" sz="3100" spc="-310" dirty="0">
                 <a:solidFill>
                   <a:srgbClr val="272352"/>
                 </a:solidFill>
@@ -10029,7 +9848,7 @@
               </a:spcBef>
             </a:pPr>
             <a:r>
-              <a:rPr lang="es-MX" sz="3200" spc="-175" dirty="0" smtClean="0">
+              <a:rPr lang="es-MX" sz="3200" spc="-175" dirty="0">
                 <a:solidFill>
                   <a:srgbClr val="272352"/>
                 </a:solidFill>
@@ -10430,7 +10249,7 @@
               <a:t> </a:t>
             </a:r>
             <a:r>
-              <a:rPr lang="es-MX" sz="3200" spc="105" dirty="0" smtClean="0">
+              <a:rPr lang="es-MX" sz="3200" spc="105" dirty="0">
                 <a:solidFill>
                   <a:srgbClr val="272352"/>
                 </a:solidFill>
@@ -10502,14 +10321,14 @@
               </a:spcBef>
             </a:pPr>
             <a:r>
-              <a:rPr sz="3200" spc="-229" dirty="0" err="1" smtClean="0">
+              <a:rPr sz="3200" spc="-229" dirty="0" err="1">
                 <a:latin typeface="Bahnschrift"/>
                 <a:cs typeface="Bahnschrift"/>
               </a:rPr>
               <a:t>Vemos</a:t>
             </a:r>
             <a:r>
-              <a:rPr sz="3200" spc="-229" dirty="0" smtClean="0">
+              <a:rPr sz="3200" spc="-229" dirty="0">
                 <a:latin typeface="Bahnschrift"/>
                 <a:cs typeface="Bahnschrift"/>
               </a:rPr>
@@ -10579,21 +10398,21 @@
               <a:t> </a:t>
             </a:r>
             <a:r>
-              <a:rPr sz="3200" spc="-95" dirty="0" smtClean="0">
+              <a:rPr sz="3200" spc="-95" dirty="0">
                 <a:latin typeface="Bahnschrift"/>
                 <a:cs typeface="Bahnschrift"/>
               </a:rPr>
               <a:t>la</a:t>
             </a:r>
             <a:r>
-              <a:rPr lang="es-MX" sz="3200" spc="-95" dirty="0" smtClean="0">
-                <a:latin typeface="Bahnschrift"/>
-                <a:cs typeface="Bahnschrift"/>
-              </a:rPr>
-              <a:t> </a:t>
-            </a:r>
-            <a:r>
-              <a:rPr sz="3200" spc="-204" dirty="0" smtClean="0">
+              <a:rPr lang="es-MX" sz="3200" spc="-95" dirty="0">
+                <a:latin typeface="Bahnschrift"/>
+                <a:cs typeface="Bahnschrift"/>
+              </a:rPr>
+              <a:t> </a:t>
+            </a:r>
+            <a:r>
+              <a:rPr sz="3200" spc="-204" dirty="0">
                 <a:latin typeface="Bahnschrift"/>
                 <a:cs typeface="Bahnschrift"/>
               </a:rPr>
@@ -10642,14 +10461,14 @@
               <a:t>color </a:t>
             </a:r>
             <a:r>
-              <a:rPr sz="3200" spc="-130" dirty="0" err="1" smtClean="0">
+              <a:rPr sz="3200" spc="-130" dirty="0" err="1">
                 <a:latin typeface="Bahnschrift"/>
                 <a:cs typeface="Bahnschrift"/>
               </a:rPr>
               <a:t>tiene</a:t>
             </a:r>
             <a:r>
-              <a:rPr sz="3200" spc="-130" dirty="0" smtClean="0">
+              <a:rPr sz="3200" spc="-130" dirty="0">
                 <a:latin typeface="Bahnschrift"/>
                 <a:cs typeface="Bahnschrift"/>
               </a:rPr>
@@ -16970,7 +16789,7 @@
               <a:t> </a:t>
             </a:r>
             <a:r>
-              <a:rPr sz="3100" spc="-105" dirty="0" err="1" smtClean="0">
+              <a:rPr sz="3100" spc="-105" dirty="0" err="1">
                 <a:solidFill>
                   <a:srgbClr val="272352"/>
                 </a:solidFill>
@@ -16980,7 +16799,7 @@
               <a:t>los</a:t>
             </a:r>
             <a:r>
-              <a:rPr sz="3100" spc="-55" dirty="0" smtClean="0">
+              <a:rPr sz="3100" spc="-55" dirty="0">
                 <a:solidFill>
                   <a:srgbClr val="272352"/>
                 </a:solidFill>
@@ -17078,7 +16897,7 @@
               </a:tabLst>
             </a:pPr>
             <a:r>
-              <a:rPr lang="es-MX" sz="3100" spc="-145" dirty="0" smtClean="0">
+              <a:rPr lang="es-MX" sz="3100" spc="-145" dirty="0">
                 <a:solidFill>
                   <a:srgbClr val="272352"/>
                 </a:solidFill>
@@ -17403,7 +17222,7 @@
               <a:t> </a:t>
             </a:r>
             <a:r>
-              <a:rPr sz="3100" spc="-95" dirty="0" err="1" smtClean="0">
+              <a:rPr sz="3100" spc="-95" dirty="0" err="1">
                 <a:solidFill>
                   <a:srgbClr val="272352"/>
                 </a:solidFill>
@@ -17413,7 +17232,7 @@
               <a:t>en</a:t>
             </a:r>
             <a:r>
-              <a:rPr sz="3100" spc="-25" dirty="0" smtClean="0">
+              <a:rPr sz="3100" spc="-25" dirty="0">
                 <a:solidFill>
                   <a:srgbClr val="272352"/>
                 </a:solidFill>
@@ -18513,11 +18332,7 @@
             </a:pPr>
             <a:r>
               <a:rPr lang="es-MX" sz="3200" spc="-175" dirty="0"/>
-              <a:t>Así entonces podemos concluir que los estados con menor numero de arrestos totales promedio entre gente blanca en los últimos 3 años </a:t>
-            </a:r>
-            <a:r>
-              <a:rPr lang="es-MX" sz="3200" spc="-175" dirty="0" smtClean="0"/>
-              <a:t>son:</a:t>
+              <a:t>Así entonces podemos concluir que los estados con menor numero de arrestos totales promedio entre gente blanca en los últimos 3 años son:</a:t>
             </a:r>
           </a:p>
           <a:p>
@@ -18533,16 +18348,12 @@
               </a:tabLst>
             </a:pPr>
             <a:r>
-              <a:rPr lang="es-MX" sz="3200" spc="-175" dirty="0" err="1" smtClean="0"/>
+              <a:rPr lang="es-MX" sz="3200" spc="-175" dirty="0" err="1"/>
               <a:t>Hawaii</a:t>
             </a:r>
             <a:r>
-              <a:rPr lang="es-MX" sz="3200" spc="-175" dirty="0" smtClean="0"/>
-              <a:t> </a:t>
-            </a:r>
-            <a:r>
               <a:rPr lang="es-MX" sz="3200" spc="-175" dirty="0"/>
-              <a:t>(HI) - 11272.000000</a:t>
+              <a:t> (HI) - 11272.000000</a:t>
             </a:r>
           </a:p>
           <a:p>
@@ -18593,7 +18404,7 @@
                 <a:tab pos="469900" algn="l"/>
               </a:tabLst>
             </a:pPr>
-            <a:endParaRPr lang="es-MX" sz="3200" spc="-175" dirty="0" smtClean="0"/>
+            <a:endParaRPr lang="es-MX" sz="3200" spc="-175" dirty="0"/>
           </a:p>
           <a:p>
             <a:pPr marL="12700">
@@ -18605,10 +18416,6 @@
                 <a:tab pos="469900" algn="l"/>
               </a:tabLst>
             </a:pPr>
-            <a:r>
-              <a:rPr lang="es-MX" sz="3200" spc="-175" dirty="0"/>
-              <a:t/>
-            </a:r>
             <a:br>
               <a:rPr lang="es-MX" sz="3200" spc="-175" dirty="0"/>
             </a:br>
@@ -18630,12 +18437,8 @@
               </a:tabLst>
             </a:pPr>
             <a:r>
-              <a:rPr lang="es-MX" sz="3200" spc="-175" dirty="0" smtClean="0"/>
-              <a:t> </a:t>
-            </a:r>
-            <a:r>
               <a:rPr lang="es-MX" sz="3200" spc="-175" dirty="0"/>
-              <a:t>California (CA) - 801275.666667</a:t>
+              <a:t> California (CA) - 801275.666667</a:t>
             </a:r>
           </a:p>
           <a:p>
@@ -18727,159 +18530,159 @@
               </a:spcBef>
             </a:pPr>
             <a:r>
-              <a:rPr lang="es-MX" sz="3300" kern="0" smtClean="0"/>
+              <a:rPr lang="es-MX" sz="3300" kern="0"/>
               <a:t>1.</a:t>
             </a:r>
             <a:r>
-              <a:rPr lang="es-MX" sz="3300" kern="0" spc="-10" smtClean="0"/>
-              <a:t> </a:t>
-            </a:r>
-            <a:r>
-              <a:rPr lang="es-MX" sz="3300" kern="0" smtClean="0"/>
+              <a:rPr lang="es-MX" sz="3300" kern="0" spc="-10"/>
+              <a:t> </a:t>
+            </a:r>
+            <a:r>
+              <a:rPr lang="es-MX" sz="3300" kern="0"/>
               <a:t>¿Cuáles</a:t>
             </a:r>
             <a:r>
-              <a:rPr lang="es-MX" sz="3300" kern="0" spc="-30" smtClean="0"/>
-              <a:t> </a:t>
-            </a:r>
-            <a:r>
-              <a:rPr lang="es-MX" sz="3300" kern="0" smtClean="0"/>
+              <a:rPr lang="es-MX" sz="3300" kern="0" spc="-30"/>
+              <a:t> </a:t>
+            </a:r>
+            <a:r>
+              <a:rPr lang="es-MX" sz="3300" kern="0"/>
               <a:t>son</a:t>
             </a:r>
             <a:r>
-              <a:rPr lang="es-MX" sz="3300" kern="0" spc="-10" smtClean="0"/>
-              <a:t> </a:t>
-            </a:r>
-            <a:r>
-              <a:rPr lang="es-MX" sz="3300" kern="0" smtClean="0"/>
+              <a:rPr lang="es-MX" sz="3300" kern="0" spc="-10"/>
+              <a:t> </a:t>
+            </a:r>
+            <a:r>
+              <a:rPr lang="es-MX" sz="3300" kern="0"/>
               <a:t>los</a:t>
             </a:r>
             <a:r>
-              <a:rPr lang="es-MX" sz="3300" kern="0" spc="-15" smtClean="0"/>
-              <a:t> </a:t>
-            </a:r>
-            <a:r>
-              <a:rPr lang="es-MX" sz="3300" kern="0" spc="-5" smtClean="0"/>
+              <a:rPr lang="es-MX" sz="3300" kern="0" spc="-15"/>
+              <a:t> </a:t>
+            </a:r>
+            <a:r>
+              <a:rPr lang="es-MX" sz="3300" kern="0" spc="-5"/>
               <a:t>estados</a:t>
             </a:r>
             <a:r>
-              <a:rPr lang="es-MX" sz="3300" kern="0" spc="10" smtClean="0"/>
-              <a:t> </a:t>
-            </a:r>
-            <a:r>
-              <a:rPr lang="es-MX" sz="3300" kern="0" spc="-5" smtClean="0"/>
+              <a:rPr lang="es-MX" sz="3300" kern="0" spc="10"/>
+              <a:t> </a:t>
+            </a:r>
+            <a:r>
+              <a:rPr lang="es-MX" sz="3300" kern="0" spc="-5"/>
               <a:t>con</a:t>
             </a:r>
             <a:r>
-              <a:rPr lang="es-MX" sz="3300" kern="0" smtClean="0"/>
+              <a:rPr lang="es-MX" sz="3300" kern="0"/>
               <a:t> más</a:t>
             </a:r>
             <a:r>
-              <a:rPr lang="es-MX" sz="3300" kern="0" spc="-10" smtClean="0"/>
-              <a:t> </a:t>
-            </a:r>
-            <a:r>
-              <a:rPr lang="es-MX" sz="3300" kern="0" smtClean="0"/>
+              <a:rPr lang="es-MX" sz="3300" kern="0" spc="-10"/>
+              <a:t> </a:t>
+            </a:r>
+            <a:r>
+              <a:rPr lang="es-MX" sz="3300" kern="0"/>
               <a:t>y</a:t>
             </a:r>
             <a:r>
-              <a:rPr lang="es-MX" sz="3300" kern="0" spc="-10" smtClean="0"/>
-              <a:t> </a:t>
-            </a:r>
-            <a:r>
-              <a:rPr lang="es-MX" sz="3300" kern="0" spc="-5" smtClean="0"/>
+              <a:rPr lang="es-MX" sz="3300" kern="0" spc="-10"/>
+              <a:t> </a:t>
+            </a:r>
+            <a:r>
+              <a:rPr lang="es-MX" sz="3300" kern="0" spc="-5"/>
               <a:t>menos</a:t>
             </a:r>
             <a:r>
-              <a:rPr lang="es-MX" sz="3300" kern="0" spc="5" smtClean="0"/>
-              <a:t> </a:t>
-            </a:r>
-            <a:r>
-              <a:rPr lang="es-MX" sz="3300" kern="0" spc="20" smtClean="0"/>
+              <a:rPr lang="es-MX" sz="3300" kern="0" spc="5"/>
+              <a:t> </a:t>
+            </a:r>
+            <a:r>
+              <a:rPr lang="es-MX" sz="3300" kern="0" spc="20"/>
               <a:t>arrestos</a:t>
             </a:r>
             <a:r>
-              <a:rPr lang="es-MX" sz="3300" kern="0" spc="-5" smtClean="0"/>
+              <a:rPr lang="es-MX" sz="3300" kern="0" spc="-5"/>
               <a:t> de</a:t>
             </a:r>
             <a:r>
-              <a:rPr lang="es-MX" sz="3300" kern="0" spc="10" smtClean="0"/>
-              <a:t> </a:t>
-            </a:r>
-            <a:r>
-              <a:rPr lang="es-MX" sz="3300" kern="0" smtClean="0"/>
+              <a:rPr lang="es-MX" sz="3300" kern="0" spc="10"/>
+              <a:t> </a:t>
+            </a:r>
+            <a:r>
+              <a:rPr lang="es-MX" sz="3300" kern="0"/>
               <a:t>gente</a:t>
             </a:r>
             <a:r>
-              <a:rPr lang="es-MX" sz="3300" kern="0" spc="-10" smtClean="0"/>
-              <a:t> </a:t>
-            </a:r>
-            <a:r>
-              <a:rPr lang="es-MX" sz="3300" kern="0" spc="-5" smtClean="0"/>
+              <a:rPr lang="es-MX" sz="3300" kern="0" spc="-10"/>
+              <a:t> </a:t>
+            </a:r>
+            <a:r>
+              <a:rPr lang="es-MX" sz="3300" kern="0" spc="-5"/>
               <a:t>blanca</a:t>
             </a:r>
             <a:r>
-              <a:rPr lang="es-MX" sz="3300" kern="0" smtClean="0"/>
+              <a:rPr lang="es-MX" sz="3300" kern="0"/>
               <a:t> y </a:t>
             </a:r>
             <a:r>
-              <a:rPr lang="es-MX" sz="3300" kern="0" spc="-1090" smtClean="0"/>
-              <a:t> </a:t>
-            </a:r>
-            <a:r>
-              <a:rPr lang="es-MX" sz="3300" kern="0" smtClean="0"/>
+              <a:rPr lang="es-MX" sz="3300" kern="0" spc="-1090"/>
+              <a:t> </a:t>
+            </a:r>
+            <a:r>
+              <a:rPr lang="es-MX" sz="3300" kern="0"/>
               <a:t>afroamericana,</a:t>
             </a:r>
             <a:r>
-              <a:rPr lang="es-MX" sz="3300" kern="0" spc="30" smtClean="0"/>
-              <a:t> </a:t>
-            </a:r>
-            <a:r>
-              <a:rPr lang="es-MX" sz="3300" kern="0" spc="-5" smtClean="0"/>
+              <a:rPr lang="es-MX" sz="3300" kern="0" spc="30"/>
+              <a:t> </a:t>
+            </a:r>
+            <a:r>
+              <a:rPr lang="es-MX" sz="3300" kern="0" spc="-5"/>
               <a:t>en conjunto</a:t>
             </a:r>
             <a:r>
-              <a:rPr lang="es-MX" sz="3300" kern="0" spc="20" smtClean="0"/>
-              <a:t> </a:t>
-            </a:r>
-            <a:r>
-              <a:rPr lang="es-MX" sz="3300" kern="0" smtClean="0"/>
+              <a:rPr lang="es-MX" sz="3300" kern="0" spc="20"/>
+              <a:t> </a:t>
+            </a:r>
+            <a:r>
+              <a:rPr lang="es-MX" sz="3300" kern="0"/>
               <a:t>y</a:t>
             </a:r>
             <a:r>
-              <a:rPr lang="es-MX" sz="3300" kern="0" spc="-10" smtClean="0"/>
+              <a:rPr lang="es-MX" sz="3300" kern="0" spc="-10"/>
               <a:t> por</a:t>
             </a:r>
             <a:r>
-              <a:rPr lang="es-MX" sz="3300" kern="0" smtClean="0"/>
-              <a:t> </a:t>
-            </a:r>
-            <a:r>
-              <a:rPr lang="es-MX" sz="3300" kern="0" spc="5" smtClean="0"/>
+              <a:rPr lang="es-MX" sz="3300" kern="0"/>
+              <a:t> </a:t>
+            </a:r>
+            <a:r>
+              <a:rPr lang="es-MX" sz="3300" kern="0" spc="5"/>
               <a:t>raza?</a:t>
             </a:r>
             <a:r>
-              <a:rPr lang="es-MX" sz="3300" kern="0" smtClean="0"/>
+              <a:rPr lang="es-MX" sz="3300" kern="0"/>
               <a:t> (promedio</a:t>
             </a:r>
             <a:r>
-              <a:rPr lang="es-MX" sz="3300" kern="0" spc="25" smtClean="0"/>
-              <a:t> </a:t>
-            </a:r>
-            <a:r>
-              <a:rPr lang="es-MX" sz="3300" kern="0" spc="5" smtClean="0"/>
+              <a:rPr lang="es-MX" sz="3300" kern="0" spc="25"/>
+              <a:t> </a:t>
+            </a:r>
+            <a:r>
+              <a:rPr lang="es-MX" sz="3300" kern="0" spc="5"/>
               <a:t>entre</a:t>
             </a:r>
             <a:r>
-              <a:rPr lang="es-MX" sz="3300" kern="0" spc="-5" smtClean="0"/>
+              <a:rPr lang="es-MX" sz="3300" kern="0" spc="-5"/>
               <a:t> 2018</a:t>
             </a:r>
             <a:r>
-              <a:rPr lang="es-MX" sz="3300" kern="0" smtClean="0"/>
+              <a:rPr lang="es-MX" sz="3300" kern="0"/>
               <a:t> y</a:t>
             </a:r>
             <a:r>
-              <a:rPr lang="es-MX" sz="3300" kern="0" spc="-5" smtClean="0"/>
+              <a:rPr lang="es-MX" sz="3300" kern="0" spc="-5"/>
               <a:t> 2020)?</a:t>
             </a:r>
             <a:endParaRPr lang="es-MX" sz="3300" kern="0" dirty="0"/>
@@ -22230,7 +22033,7 @@
               </a:tabLst>
             </a:pPr>
             <a:r>
-              <a:rPr lang="es-MX" spc="-229" dirty="0" smtClean="0"/>
+              <a:rPr lang="es-MX" spc="-229" dirty="0"/>
               <a:t>Idaho (ID)</a:t>
             </a:r>
             <a:endParaRPr spc="-229" dirty="0"/>
@@ -22249,7 +22052,7 @@
               </a:tabLst>
             </a:pPr>
             <a:r>
-              <a:rPr lang="es-MX" spc="-204" dirty="0" smtClean="0"/>
+              <a:rPr lang="es-MX" spc="-204" dirty="0"/>
               <a:t>Wyoming (WY)</a:t>
             </a:r>
             <a:endParaRPr spc="-204" dirty="0"/>
@@ -22405,7 +22208,7 @@
                 <a:spcPts val="50"/>
               </a:spcBef>
             </a:pPr>
-            <a:endParaRPr lang="es-MX" spc="-160" dirty="0" smtClean="0"/>
+            <a:endParaRPr lang="es-MX" spc="-160" dirty="0"/>
           </a:p>
           <a:p>
             <a:pPr marL="622300" indent="-514350">
@@ -22419,7 +22222,7 @@
               <a:buAutoNum type="arabicPeriod"/>
             </a:pPr>
             <a:r>
-              <a:rPr lang="es-MX" spc="-160" dirty="0" smtClean="0"/>
+              <a:rPr lang="es-MX" spc="-160" dirty="0"/>
               <a:t>Distrito de Columbia (DC)</a:t>
             </a:r>
           </a:p>
@@ -22435,11 +22238,11 @@
               <a:buAutoNum type="arabicPeriod"/>
             </a:pPr>
             <a:r>
-              <a:rPr lang="es-MX" spc="-160" dirty="0" err="1" smtClean="0"/>
+              <a:rPr lang="es-MX" spc="-160" dirty="0" err="1"/>
               <a:t>Misissippi</a:t>
             </a:r>
             <a:r>
-              <a:rPr lang="es-MX" spc="-160" dirty="0" smtClean="0"/>
+              <a:rPr lang="es-MX" spc="-160" dirty="0"/>
               <a:t> (MS)</a:t>
             </a:r>
           </a:p>
@@ -22455,11 +22258,11 @@
               <a:buAutoNum type="arabicPeriod"/>
             </a:pPr>
             <a:r>
-              <a:rPr lang="es-MX" spc="-160" dirty="0" err="1" smtClean="0"/>
+              <a:rPr lang="es-MX" spc="-160" dirty="0" err="1"/>
               <a:t>Lousiana</a:t>
             </a:r>
             <a:r>
-              <a:rPr lang="es-MX" spc="-160" dirty="0" smtClean="0"/>
+              <a:rPr lang="es-MX" spc="-160" dirty="0"/>
               <a:t> (LA)</a:t>
             </a:r>
             <a:endParaRPr spc="-160" dirty="0"/>

</xml_diff>